<commit_message>
Updated model & ppt.
</commit_message>
<xml_diff>
--- a/docs/Theory/Osmotic Pressure.pptx
+++ b/docs/Theory/Osmotic Pressure.pptx
@@ -5,10 +5,10 @@
     <p:sldMasterId id="2147483648" r:id="rId4"/>
   </p:sldMasterIdLst>
   <p:notesMasterIdLst>
-    <p:notesMasterId r:id="rId10"/>
+    <p:notesMasterId r:id="rId11"/>
   </p:notesMasterIdLst>
   <p:handoutMasterIdLst>
-    <p:handoutMasterId r:id="rId11"/>
+    <p:handoutMasterId r:id="rId12"/>
   </p:handoutMasterIdLst>
   <p:sldIdLst>
     <p:sldId id="256" r:id="rId5"/>
@@ -16,6 +16,7 @@
     <p:sldId id="275" r:id="rId7"/>
     <p:sldId id="281" r:id="rId8"/>
     <p:sldId id="282" r:id="rId9"/>
+    <p:sldId id="284" r:id="rId10"/>
   </p:sldIdLst>
   <p:sldSz cx="12192000" cy="6858000"/>
   <p:notesSz cx="6858000" cy="9144000"/>
@@ -150,7 +151,7 @@
 <file path=ppt/revisionInfo.xml><?xml version="1.0" encoding="utf-8"?>
 <p1510:revInfo xmlns:a="http://schemas.openxmlformats.org/drawingml/2006/main" xmlns:r="http://schemas.openxmlformats.org/officeDocument/2006/relationships" xmlns:p1510="http://schemas.microsoft.com/office/powerpoint/2015/10/main">
   <p1510:revLst>
-    <p1510:client id="{0847339C-3AEF-4521-898E-233CA50B0B21}" v="88" dt="2025-08-18T18:22:34.193"/>
+    <p1510:client id="{71D38871-8217-4C7A-ADE4-3FD32D62ACA6}" v="1" dt="2025-08-29T12:30:01.397"/>
   </p1510:revLst>
 </p1510:revInfo>
 </file>
@@ -220,14 +221,6 @@
           <pc:docMk/>
           <pc:sldMk cId="1410719067" sldId="283"/>
         </pc:sldMkLst>
-        <pc:spChg chg="del">
-          <ac:chgData name="Erin McGarrity" userId="ac89f31f-03f6-48f6-8b30-1571b5629051" providerId="ADAL" clId="{0847339C-3AEF-4521-898E-233CA50B0B21}" dt="2025-08-18T18:02:14.241" v="70" actId="478"/>
-          <ac:spMkLst>
-            <pc:docMk/>
-            <pc:sldMk cId="1410719067" sldId="283"/>
-            <ac:spMk id="3" creationId="{F1D5F1A5-EC58-C76F-C566-752BE097EFBD}"/>
-          </ac:spMkLst>
-        </pc:spChg>
         <pc:spChg chg="add mod">
           <ac:chgData name="Erin McGarrity" userId="ac89f31f-03f6-48f6-8b30-1571b5629051" providerId="ADAL" clId="{0847339C-3AEF-4521-898E-233CA50B0B21}" dt="2025-08-18T18:12:27.121" v="138" actId="207"/>
           <ac:spMkLst>
@@ -375,6 +368,142 @@
       </pc:sldChg>
     </pc:docChg>
   </pc:docChgLst>
+  <pc:docChgLst>
+    <pc:chgData name="Erin McGarrity" userId="ac89f31f-03f6-48f6-8b30-1571b5629051" providerId="ADAL" clId="{71D38871-8217-4C7A-ADE4-3FD32D62ACA6}"/>
+    <pc:docChg chg="undo custSel addSld modSld">
+      <pc:chgData name="Erin McGarrity" userId="ac89f31f-03f6-48f6-8b30-1571b5629051" providerId="ADAL" clId="{71D38871-8217-4C7A-ADE4-3FD32D62ACA6}" dt="2025-08-29T12:31:20.964" v="23" actId="1036"/>
+      <pc:docMkLst>
+        <pc:docMk/>
+      </pc:docMkLst>
+      <pc:sldChg chg="delSp modSp add mod">
+        <pc:chgData name="Erin McGarrity" userId="ac89f31f-03f6-48f6-8b30-1571b5629051" providerId="ADAL" clId="{71D38871-8217-4C7A-ADE4-3FD32D62ACA6}" dt="2025-08-29T12:31:20.964" v="23" actId="1036"/>
+        <pc:sldMkLst>
+          <pc:docMk/>
+          <pc:sldMk cId="1145269144" sldId="284"/>
+        </pc:sldMkLst>
+        <pc:spChg chg="mod">
+          <ac:chgData name="Erin McGarrity" userId="ac89f31f-03f6-48f6-8b30-1571b5629051" providerId="ADAL" clId="{71D38871-8217-4C7A-ADE4-3FD32D62ACA6}" dt="2025-08-29T12:31:20.964" v="23" actId="1036"/>
+          <ac:spMkLst>
+            <pc:docMk/>
+            <pc:sldMk cId="1145269144" sldId="284"/>
+            <ac:spMk id="6" creationId="{48511F93-9911-3062-341C-F4126BEF2130}"/>
+          </ac:spMkLst>
+        </pc:spChg>
+        <pc:spChg chg="mod">
+          <ac:chgData name="Erin McGarrity" userId="ac89f31f-03f6-48f6-8b30-1571b5629051" providerId="ADAL" clId="{71D38871-8217-4C7A-ADE4-3FD32D62ACA6}" dt="2025-08-29T12:31:20.964" v="23" actId="1036"/>
+          <ac:spMkLst>
+            <pc:docMk/>
+            <pc:sldMk cId="1145269144" sldId="284"/>
+            <ac:spMk id="7" creationId="{BCEB89CE-388E-8721-5747-5833E7E5D28E}"/>
+          </ac:spMkLst>
+        </pc:spChg>
+        <pc:spChg chg="mod">
+          <ac:chgData name="Erin McGarrity" userId="ac89f31f-03f6-48f6-8b30-1571b5629051" providerId="ADAL" clId="{71D38871-8217-4C7A-ADE4-3FD32D62ACA6}" dt="2025-08-29T12:31:20.964" v="23" actId="1036"/>
+          <ac:spMkLst>
+            <pc:docMk/>
+            <pc:sldMk cId="1145269144" sldId="284"/>
+            <ac:spMk id="8" creationId="{C1341A38-2EF8-D538-61E0-1ACD38DCF185}"/>
+          </ac:spMkLst>
+        </pc:spChg>
+        <pc:spChg chg="mod">
+          <ac:chgData name="Erin McGarrity" userId="ac89f31f-03f6-48f6-8b30-1571b5629051" providerId="ADAL" clId="{71D38871-8217-4C7A-ADE4-3FD32D62ACA6}" dt="2025-08-29T12:31:20.964" v="23" actId="1036"/>
+          <ac:spMkLst>
+            <pc:docMk/>
+            <pc:sldMk cId="1145269144" sldId="284"/>
+            <ac:spMk id="9" creationId="{B55ED05B-F3E2-9F96-0EEF-EFAC963AA673}"/>
+          </ac:spMkLst>
+        </pc:spChg>
+        <pc:spChg chg="del">
+          <ac:chgData name="Erin McGarrity" userId="ac89f31f-03f6-48f6-8b30-1571b5629051" providerId="ADAL" clId="{71D38871-8217-4C7A-ADE4-3FD32D62ACA6}" dt="2025-08-29T12:30:42.007" v="9" actId="478"/>
+          <ac:spMkLst>
+            <pc:docMk/>
+            <pc:sldMk cId="1145269144" sldId="284"/>
+            <ac:spMk id="13" creationId="{040BADEB-C6BC-7A27-720F-37408E6FA1E4}"/>
+          </ac:spMkLst>
+        </pc:spChg>
+        <pc:spChg chg="del">
+          <ac:chgData name="Erin McGarrity" userId="ac89f31f-03f6-48f6-8b30-1571b5629051" providerId="ADAL" clId="{71D38871-8217-4C7A-ADE4-3FD32D62ACA6}" dt="2025-08-29T12:30:14.631" v="1" actId="478"/>
+          <ac:spMkLst>
+            <pc:docMk/>
+            <pc:sldMk cId="1145269144" sldId="284"/>
+            <ac:spMk id="20" creationId="{F60A3E2D-C607-4499-6850-7E576875FE03}"/>
+          </ac:spMkLst>
+        </pc:spChg>
+        <pc:spChg chg="del mod">
+          <ac:chgData name="Erin McGarrity" userId="ac89f31f-03f6-48f6-8b30-1571b5629051" providerId="ADAL" clId="{71D38871-8217-4C7A-ADE4-3FD32D62ACA6}" dt="2025-08-29T12:30:32.844" v="7" actId="478"/>
+          <ac:spMkLst>
+            <pc:docMk/>
+            <pc:sldMk cId="1145269144" sldId="284"/>
+            <ac:spMk id="24" creationId="{06307F00-FABD-7D23-4610-26FD2A6D8F16}"/>
+          </ac:spMkLst>
+        </pc:spChg>
+        <pc:spChg chg="del">
+          <ac:chgData name="Erin McGarrity" userId="ac89f31f-03f6-48f6-8b30-1571b5629051" providerId="ADAL" clId="{71D38871-8217-4C7A-ADE4-3FD32D62ACA6}" dt="2025-08-29T12:30:20.274" v="3" actId="478"/>
+          <ac:spMkLst>
+            <pc:docMk/>
+            <pc:sldMk cId="1145269144" sldId="284"/>
+            <ac:spMk id="26" creationId="{B4EC308C-DC93-1806-DA0F-44E0E85B70E0}"/>
+          </ac:spMkLst>
+        </pc:spChg>
+        <pc:cxnChg chg="del">
+          <ac:chgData name="Erin McGarrity" userId="ac89f31f-03f6-48f6-8b30-1571b5629051" providerId="ADAL" clId="{71D38871-8217-4C7A-ADE4-3FD32D62ACA6}" dt="2025-08-29T12:30:44.642" v="10" actId="478"/>
+          <ac:cxnSpMkLst>
+            <pc:docMk/>
+            <pc:sldMk cId="1145269144" sldId="284"/>
+            <ac:cxnSpMk id="11" creationId="{CFCCE91A-AE8B-7CCA-FEE8-129855A035A1}"/>
+          </ac:cxnSpMkLst>
+        </pc:cxnChg>
+        <pc:cxnChg chg="del">
+          <ac:chgData name="Erin McGarrity" userId="ac89f31f-03f6-48f6-8b30-1571b5629051" providerId="ADAL" clId="{71D38871-8217-4C7A-ADE4-3FD32D62ACA6}" dt="2025-08-29T12:30:48.668" v="11" actId="478"/>
+          <ac:cxnSpMkLst>
+            <pc:docMk/>
+            <pc:sldMk cId="1145269144" sldId="284"/>
+            <ac:cxnSpMk id="12" creationId="{5FF66EA0-865F-0590-DF33-00C8EC96AD0B}"/>
+          </ac:cxnSpMkLst>
+        </pc:cxnChg>
+        <pc:cxnChg chg="del">
+          <ac:chgData name="Erin McGarrity" userId="ac89f31f-03f6-48f6-8b30-1571b5629051" providerId="ADAL" clId="{71D38871-8217-4C7A-ADE4-3FD32D62ACA6}" dt="2025-08-29T12:30:36.893" v="8" actId="478"/>
+          <ac:cxnSpMkLst>
+            <pc:docMk/>
+            <pc:sldMk cId="1145269144" sldId="284"/>
+            <ac:cxnSpMk id="15" creationId="{3EE948AF-1C58-5E77-A17D-CE0E51642B0C}"/>
+          </ac:cxnSpMkLst>
+        </pc:cxnChg>
+        <pc:cxnChg chg="del">
+          <ac:chgData name="Erin McGarrity" userId="ac89f31f-03f6-48f6-8b30-1571b5629051" providerId="ADAL" clId="{71D38871-8217-4C7A-ADE4-3FD32D62ACA6}" dt="2025-08-29T12:30:36.893" v="8" actId="478"/>
+          <ac:cxnSpMkLst>
+            <pc:docMk/>
+            <pc:sldMk cId="1145269144" sldId="284"/>
+            <ac:cxnSpMk id="16" creationId="{26234347-99B4-D5AA-3FE7-7A0093A85B41}"/>
+          </ac:cxnSpMkLst>
+        </pc:cxnChg>
+        <pc:cxnChg chg="del">
+          <ac:chgData name="Erin McGarrity" userId="ac89f31f-03f6-48f6-8b30-1571b5629051" providerId="ADAL" clId="{71D38871-8217-4C7A-ADE4-3FD32D62ACA6}" dt="2025-08-29T12:30:16.949" v="2" actId="478"/>
+          <ac:cxnSpMkLst>
+            <pc:docMk/>
+            <pc:sldMk cId="1145269144" sldId="284"/>
+            <ac:cxnSpMk id="18" creationId="{E7917D83-3C5A-2081-24CD-EFB45C87DD74}"/>
+          </ac:cxnSpMkLst>
+        </pc:cxnChg>
+        <pc:cxnChg chg="del">
+          <ac:chgData name="Erin McGarrity" userId="ac89f31f-03f6-48f6-8b30-1571b5629051" providerId="ADAL" clId="{71D38871-8217-4C7A-ADE4-3FD32D62ACA6}" dt="2025-08-29T12:30:27.410" v="5" actId="478"/>
+          <ac:cxnSpMkLst>
+            <pc:docMk/>
+            <pc:sldMk cId="1145269144" sldId="284"/>
+            <ac:cxnSpMk id="21" creationId="{805ECEC4-CBEB-E33C-3555-936C5E76E493}"/>
+          </ac:cxnSpMkLst>
+        </pc:cxnChg>
+        <pc:cxnChg chg="del mod">
+          <ac:chgData name="Erin McGarrity" userId="ac89f31f-03f6-48f6-8b30-1571b5629051" providerId="ADAL" clId="{71D38871-8217-4C7A-ADE4-3FD32D62ACA6}" dt="2025-08-29T12:30:24.878" v="4" actId="478"/>
+          <ac:cxnSpMkLst>
+            <pc:docMk/>
+            <pc:sldMk cId="1145269144" sldId="284"/>
+            <ac:cxnSpMk id="27" creationId="{01169E95-D5F0-5678-39EC-3973FC976D90}"/>
+          </ac:cxnSpMkLst>
+        </pc:cxnChg>
+      </pc:sldChg>
+    </pc:docChg>
+  </pc:docChgLst>
 </pc:chgInfo>
 </file>
 
@@ -461,7 +590,7 @@
             <a:fld id="{5F993C83-2184-4286-ABE1-941A40B40C8F}" type="datetimeFigureOut">
               <a:rPr lang="en-US" smtClean="0"/>
               <a:pPr/>
-              <a:t>8/19/2025</a:t>
+              <a:t>8/29/2025</a:t>
             </a:fld>
             <a:endParaRPr lang="en-US"/>
           </a:p>
@@ -628,7 +757,7 @@
             <a:fld id="{6053241F-7ED4-45AC-844C-15DB0D5F9CCD}" type="datetimeFigureOut">
               <a:rPr lang="en-US" smtClean="0"/>
               <a:pPr/>
-              <a:t>8/19/2025</a:t>
+              <a:t>8/29/2025</a:t>
             </a:fld>
             <a:endParaRPr lang="en-US"/>
           </a:p>
@@ -6324,6 +6453,492 @@
 </p:sld>
 </file>
 
+<file path=ppt/slides/slide6.xml><?xml version="1.0" encoding="utf-8"?>
+<p:sld xmlns:a="http://schemas.openxmlformats.org/drawingml/2006/main" xmlns:r="http://schemas.openxmlformats.org/officeDocument/2006/relationships" xmlns:p="http://schemas.openxmlformats.org/presentationml/2006/main">
+  <p:cSld>
+    <p:spTree>
+      <p:nvGrpSpPr>
+        <p:cNvPr id="1" name="">
+          <a:extLst>
+            <a:ext uri="{FF2B5EF4-FFF2-40B4-BE49-F238E27FC236}">
+              <a16:creationId xmlns:a16="http://schemas.microsoft.com/office/drawing/2014/main" id="{F893D3BE-2635-B966-B402-EEE4E4495296}"/>
+            </a:ext>
+          </a:extLst>
+        </p:cNvPr>
+        <p:cNvGrpSpPr/>
+        <p:nvPr/>
+      </p:nvGrpSpPr>
+      <p:grpSpPr>
+        <a:xfrm>
+          <a:off x="0" y="0"/>
+          <a:ext cx="0" cy="0"/>
+          <a:chOff x="0" y="0"/>
+          <a:chExt cx="0" cy="0"/>
+        </a:xfrm>
+      </p:grpSpPr>
+      <p:sp>
+        <p:nvSpPr>
+          <p:cNvPr id="2" name="Title 1">
+            <a:extLst>
+              <a:ext uri="{FF2B5EF4-FFF2-40B4-BE49-F238E27FC236}">
+                <a16:creationId xmlns:a16="http://schemas.microsoft.com/office/drawing/2014/main" id="{7C81F8B0-A943-AA74-3801-EB672C7717D7}"/>
+              </a:ext>
+            </a:extLst>
+          </p:cNvPr>
+          <p:cNvSpPr>
+            <a:spLocks noGrp="1"/>
+          </p:cNvSpPr>
+          <p:nvPr>
+            <p:ph type="title"/>
+          </p:nvPr>
+        </p:nvSpPr>
+        <p:spPr/>
+        <p:txBody>
+          <a:bodyPr/>
+          <a:lstStyle/>
+          <a:p>
+            <a:endParaRPr lang="en-US"/>
+          </a:p>
+        </p:txBody>
+      </p:sp>
+      <p:sp>
+        <p:nvSpPr>
+          <p:cNvPr id="4" name="Block Arc 3">
+            <a:extLst>
+              <a:ext uri="{FF2B5EF4-FFF2-40B4-BE49-F238E27FC236}">
+                <a16:creationId xmlns:a16="http://schemas.microsoft.com/office/drawing/2014/main" id="{52BFC0C6-84B8-EC0F-D0B5-C922322137B7}"/>
+              </a:ext>
+            </a:extLst>
+          </p:cNvPr>
+          <p:cNvSpPr/>
+          <p:nvPr/>
+        </p:nvSpPr>
+        <p:spPr>
+          <a:xfrm rot="10800000">
+            <a:off x="4419600" y="2667000"/>
+            <a:ext cx="2057400" cy="2057400"/>
+          </a:xfrm>
+          <a:prstGeom prst="blockArc">
+            <a:avLst>
+              <a:gd name="adj1" fmla="val 10800000"/>
+              <a:gd name="adj2" fmla="val 16212361"/>
+              <a:gd name="adj3" fmla="val 27630"/>
+            </a:avLst>
+          </a:prstGeom>
+          <a:pattFill prst="lgConfetti">
+            <a:fgClr>
+              <a:schemeClr val="accent2">
+                <a:lumMod val="40000"/>
+                <a:lumOff val="60000"/>
+              </a:schemeClr>
+            </a:fgClr>
+            <a:bgClr>
+              <a:schemeClr val="bg1"/>
+            </a:bgClr>
+          </a:pattFill>
+          <a:ln>
+            <a:noFill/>
+          </a:ln>
+        </p:spPr>
+        <p:style>
+          <a:lnRef idx="2">
+            <a:schemeClr val="accent1">
+              <a:shade val="50000"/>
+            </a:schemeClr>
+          </a:lnRef>
+          <a:fillRef idx="1">
+            <a:schemeClr val="accent1"/>
+          </a:fillRef>
+          <a:effectRef idx="0">
+            <a:schemeClr val="accent1"/>
+          </a:effectRef>
+          <a:fontRef idx="minor">
+            <a:schemeClr val="lt1"/>
+          </a:fontRef>
+        </p:style>
+        <p:txBody>
+          <a:bodyPr rtlCol="0" anchor="ctr"/>
+          <a:lstStyle/>
+          <a:p>
+            <a:pPr algn="ctr"/>
+            <a:endParaRPr lang="en-US" b="1" dirty="0">
+              <a:solidFill>
+                <a:schemeClr val="tx1"/>
+              </a:solidFill>
+              <a:latin typeface="Arial" pitchFamily="34" charset="0"/>
+              <a:cs typeface="Arial" pitchFamily="34" charset="0"/>
+            </a:endParaRPr>
+          </a:p>
+        </p:txBody>
+      </p:sp>
+      <p:sp>
+        <p:nvSpPr>
+          <p:cNvPr id="5" name="Block Arc 4">
+            <a:extLst>
+              <a:ext uri="{FF2B5EF4-FFF2-40B4-BE49-F238E27FC236}">
+                <a16:creationId xmlns:a16="http://schemas.microsoft.com/office/drawing/2014/main" id="{74388B63-78A4-7E95-2E9B-F10E9D4542BC}"/>
+              </a:ext>
+            </a:extLst>
+          </p:cNvPr>
+          <p:cNvSpPr/>
+          <p:nvPr/>
+        </p:nvSpPr>
+        <p:spPr>
+          <a:xfrm rot="10800000">
+            <a:off x="4419599" y="2667000"/>
+            <a:ext cx="2057400" cy="2057400"/>
+          </a:xfrm>
+          <a:prstGeom prst="blockArc">
+            <a:avLst>
+              <a:gd name="adj1" fmla="val 16181993"/>
+              <a:gd name="adj2" fmla="val 14915"/>
+              <a:gd name="adj3" fmla="val 27569"/>
+            </a:avLst>
+          </a:prstGeom>
+          <a:solidFill>
+            <a:schemeClr val="accent2">
+              <a:lumMod val="40000"/>
+              <a:lumOff val="60000"/>
+            </a:schemeClr>
+          </a:solidFill>
+          <a:ln>
+            <a:noFill/>
+          </a:ln>
+        </p:spPr>
+        <p:style>
+          <a:lnRef idx="2">
+            <a:schemeClr val="accent1">
+              <a:shade val="50000"/>
+            </a:schemeClr>
+          </a:lnRef>
+          <a:fillRef idx="1">
+            <a:schemeClr val="accent1"/>
+          </a:fillRef>
+          <a:effectRef idx="0">
+            <a:schemeClr val="accent1"/>
+          </a:effectRef>
+          <a:fontRef idx="minor">
+            <a:schemeClr val="lt1"/>
+          </a:fontRef>
+        </p:style>
+        <p:txBody>
+          <a:bodyPr rtlCol="0" anchor="ctr"/>
+          <a:lstStyle/>
+          <a:p>
+            <a:pPr algn="ctr"/>
+            <a:endParaRPr lang="en-US" b="1" dirty="0">
+              <a:solidFill>
+                <a:schemeClr val="tx1"/>
+              </a:solidFill>
+              <a:latin typeface="Arial" pitchFamily="34" charset="0"/>
+              <a:cs typeface="Arial" pitchFamily="34" charset="0"/>
+            </a:endParaRPr>
+          </a:p>
+        </p:txBody>
+      </p:sp>
+      <p:sp>
+        <p:nvSpPr>
+          <p:cNvPr id="6" name="Rectangle 5">
+            <a:extLst>
+              <a:ext uri="{FF2B5EF4-FFF2-40B4-BE49-F238E27FC236}">
+                <a16:creationId xmlns:a16="http://schemas.microsoft.com/office/drawing/2014/main" id="{48511F93-9911-3062-341C-F4126BEF2130}"/>
+              </a:ext>
+            </a:extLst>
+          </p:cNvPr>
+          <p:cNvSpPr/>
+          <p:nvPr/>
+        </p:nvSpPr>
+        <p:spPr>
+          <a:xfrm>
+            <a:off x="4419597" y="3368040"/>
+            <a:ext cx="566928" cy="365760"/>
+          </a:xfrm>
+          <a:prstGeom prst="rect">
+            <a:avLst/>
+          </a:prstGeom>
+          <a:solidFill>
+            <a:schemeClr val="accent2">
+              <a:lumMod val="40000"/>
+              <a:lumOff val="60000"/>
+            </a:schemeClr>
+          </a:solidFill>
+          <a:ln>
+            <a:noFill/>
+          </a:ln>
+        </p:spPr>
+        <p:style>
+          <a:lnRef idx="2">
+            <a:schemeClr val="accent1">
+              <a:shade val="50000"/>
+            </a:schemeClr>
+          </a:lnRef>
+          <a:fillRef idx="1">
+            <a:schemeClr val="accent1"/>
+          </a:fillRef>
+          <a:effectRef idx="0">
+            <a:schemeClr val="accent1"/>
+          </a:effectRef>
+          <a:fontRef idx="minor">
+            <a:schemeClr val="lt1"/>
+          </a:fontRef>
+        </p:style>
+        <p:txBody>
+          <a:bodyPr rtlCol="0" anchor="ctr"/>
+          <a:lstStyle/>
+          <a:p>
+            <a:pPr algn="ctr"/>
+            <a:endParaRPr lang="en-US" b="1" dirty="0">
+              <a:latin typeface="Arial" pitchFamily="34" charset="0"/>
+              <a:cs typeface="Arial" pitchFamily="34" charset="0"/>
+            </a:endParaRPr>
+          </a:p>
+        </p:txBody>
+      </p:sp>
+      <p:sp>
+        <p:nvSpPr>
+          <p:cNvPr id="7" name="Rectangle 6">
+            <a:extLst>
+              <a:ext uri="{FF2B5EF4-FFF2-40B4-BE49-F238E27FC236}">
+                <a16:creationId xmlns:a16="http://schemas.microsoft.com/office/drawing/2014/main" id="{BCEB89CE-388E-8721-5747-5833E7E5D28E}"/>
+              </a:ext>
+            </a:extLst>
+          </p:cNvPr>
+          <p:cNvSpPr/>
+          <p:nvPr/>
+        </p:nvSpPr>
+        <p:spPr>
+          <a:xfrm>
+            <a:off x="5910071" y="2819400"/>
+            <a:ext cx="566928" cy="914400"/>
+          </a:xfrm>
+          <a:prstGeom prst="rect">
+            <a:avLst/>
+          </a:prstGeom>
+          <a:pattFill prst="lgConfetti">
+            <a:fgClr>
+              <a:schemeClr val="accent2">
+                <a:lumMod val="40000"/>
+                <a:lumOff val="60000"/>
+              </a:schemeClr>
+            </a:fgClr>
+            <a:bgClr>
+              <a:schemeClr val="bg1"/>
+            </a:bgClr>
+          </a:pattFill>
+          <a:ln>
+            <a:noFill/>
+          </a:ln>
+        </p:spPr>
+        <p:style>
+          <a:lnRef idx="2">
+            <a:schemeClr val="accent1">
+              <a:shade val="50000"/>
+            </a:schemeClr>
+          </a:lnRef>
+          <a:fillRef idx="1">
+            <a:schemeClr val="accent1"/>
+          </a:fillRef>
+          <a:effectRef idx="0">
+            <a:schemeClr val="accent1"/>
+          </a:effectRef>
+          <a:fontRef idx="minor">
+            <a:schemeClr val="lt1"/>
+          </a:fontRef>
+        </p:style>
+        <p:txBody>
+          <a:bodyPr rtlCol="0" anchor="ctr"/>
+          <a:lstStyle/>
+          <a:p>
+            <a:pPr algn="ctr"/>
+            <a:endParaRPr lang="en-US" b="1" dirty="0">
+              <a:latin typeface="Arial" pitchFamily="34" charset="0"/>
+              <a:cs typeface="Arial" pitchFamily="34" charset="0"/>
+            </a:endParaRPr>
+          </a:p>
+        </p:txBody>
+      </p:sp>
+      <p:sp>
+        <p:nvSpPr>
+          <p:cNvPr id="8" name="Rectangle 7">
+            <a:extLst>
+              <a:ext uri="{FF2B5EF4-FFF2-40B4-BE49-F238E27FC236}">
+                <a16:creationId xmlns:a16="http://schemas.microsoft.com/office/drawing/2014/main" id="{C1341A38-2EF8-D538-61E0-1ACD38DCF185}"/>
+              </a:ext>
+            </a:extLst>
+          </p:cNvPr>
+          <p:cNvSpPr/>
+          <p:nvPr/>
+        </p:nvSpPr>
+        <p:spPr>
+          <a:xfrm>
+            <a:off x="4419597" y="1866900"/>
+            <a:ext cx="566928" cy="1501140"/>
+          </a:xfrm>
+          <a:prstGeom prst="rect">
+            <a:avLst/>
+          </a:prstGeom>
+          <a:solidFill>
+            <a:schemeClr val="bg1">
+              <a:lumMod val="85000"/>
+            </a:schemeClr>
+          </a:solidFill>
+          <a:ln>
+            <a:noFill/>
+          </a:ln>
+        </p:spPr>
+        <p:style>
+          <a:lnRef idx="2">
+            <a:schemeClr val="accent1">
+              <a:shade val="50000"/>
+            </a:schemeClr>
+          </a:lnRef>
+          <a:fillRef idx="1">
+            <a:schemeClr val="accent1"/>
+          </a:fillRef>
+          <a:effectRef idx="0">
+            <a:schemeClr val="accent1"/>
+          </a:effectRef>
+          <a:fontRef idx="minor">
+            <a:schemeClr val="lt1"/>
+          </a:fontRef>
+        </p:style>
+        <p:txBody>
+          <a:bodyPr rtlCol="0" anchor="ctr"/>
+          <a:lstStyle/>
+          <a:p>
+            <a:pPr algn="ctr"/>
+            <a:endParaRPr lang="en-US" b="1" dirty="0">
+              <a:latin typeface="Arial" pitchFamily="34" charset="0"/>
+              <a:cs typeface="Arial" pitchFamily="34" charset="0"/>
+            </a:endParaRPr>
+          </a:p>
+        </p:txBody>
+      </p:sp>
+      <p:sp>
+        <p:nvSpPr>
+          <p:cNvPr id="9" name="Rectangle 8">
+            <a:extLst>
+              <a:ext uri="{FF2B5EF4-FFF2-40B4-BE49-F238E27FC236}">
+                <a16:creationId xmlns:a16="http://schemas.microsoft.com/office/drawing/2014/main" id="{B55ED05B-F3E2-9F96-0EEF-EFAC963AA673}"/>
+              </a:ext>
+            </a:extLst>
+          </p:cNvPr>
+          <p:cNvSpPr/>
+          <p:nvPr/>
+        </p:nvSpPr>
+        <p:spPr>
+          <a:xfrm>
+            <a:off x="5910071" y="1866900"/>
+            <a:ext cx="566928" cy="952500"/>
+          </a:xfrm>
+          <a:prstGeom prst="rect">
+            <a:avLst/>
+          </a:prstGeom>
+          <a:solidFill>
+            <a:schemeClr val="bg1">
+              <a:lumMod val="85000"/>
+            </a:schemeClr>
+          </a:solidFill>
+          <a:ln>
+            <a:noFill/>
+          </a:ln>
+        </p:spPr>
+        <p:style>
+          <a:lnRef idx="2">
+            <a:schemeClr val="accent1">
+              <a:shade val="50000"/>
+            </a:schemeClr>
+          </a:lnRef>
+          <a:fillRef idx="1">
+            <a:schemeClr val="accent1"/>
+          </a:fillRef>
+          <a:effectRef idx="0">
+            <a:schemeClr val="accent1"/>
+          </a:effectRef>
+          <a:fontRef idx="minor">
+            <a:schemeClr val="lt1"/>
+          </a:fontRef>
+        </p:style>
+        <p:txBody>
+          <a:bodyPr rtlCol="0" anchor="ctr"/>
+          <a:lstStyle/>
+          <a:p>
+            <a:pPr algn="ctr"/>
+            <a:endParaRPr lang="en-US" b="1" dirty="0">
+              <a:latin typeface="Arial" pitchFamily="34" charset="0"/>
+              <a:cs typeface="Arial" pitchFamily="34" charset="0"/>
+            </a:endParaRPr>
+          </a:p>
+        </p:txBody>
+      </p:sp>
+      <p:sp>
+        <p:nvSpPr>
+          <p:cNvPr id="25" name="Rectangle 24">
+            <a:extLst>
+              <a:ext uri="{FF2B5EF4-FFF2-40B4-BE49-F238E27FC236}">
+                <a16:creationId xmlns:a16="http://schemas.microsoft.com/office/drawing/2014/main" id="{0E21DBDB-138B-84C1-E93A-E700674BAC24}"/>
+              </a:ext>
+            </a:extLst>
+          </p:cNvPr>
+          <p:cNvSpPr/>
+          <p:nvPr/>
+        </p:nvSpPr>
+        <p:spPr>
+          <a:xfrm>
+            <a:off x="5432473" y="4148330"/>
+            <a:ext cx="73152" cy="576072"/>
+          </a:xfrm>
+          <a:prstGeom prst="rect">
+            <a:avLst/>
+          </a:prstGeom>
+          <a:solidFill>
+            <a:schemeClr val="accent4"/>
+          </a:solidFill>
+          <a:ln>
+            <a:noFill/>
+          </a:ln>
+        </p:spPr>
+        <p:style>
+          <a:lnRef idx="2">
+            <a:schemeClr val="accent1">
+              <a:shade val="50000"/>
+            </a:schemeClr>
+          </a:lnRef>
+          <a:fillRef idx="1">
+            <a:schemeClr val="accent1"/>
+          </a:fillRef>
+          <a:effectRef idx="0">
+            <a:schemeClr val="accent1"/>
+          </a:effectRef>
+          <a:fontRef idx="minor">
+            <a:schemeClr val="lt1"/>
+          </a:fontRef>
+        </p:style>
+        <p:txBody>
+          <a:bodyPr rtlCol="0" anchor="ctr"/>
+          <a:lstStyle/>
+          <a:p>
+            <a:pPr algn="ctr"/>
+            <a:endParaRPr lang="en-US" b="1" dirty="0">
+              <a:latin typeface="Arial" pitchFamily="34" charset="0"/>
+              <a:cs typeface="Arial" pitchFamily="34" charset="0"/>
+            </a:endParaRPr>
+          </a:p>
+        </p:txBody>
+      </p:sp>
+    </p:spTree>
+    <p:extLst>
+      <p:ext uri="{BB962C8B-B14F-4D97-AF65-F5344CB8AC3E}">
+        <p14:creationId xmlns:p14="http://schemas.microsoft.com/office/powerpoint/2010/main" val="1145269144"/>
+      </p:ext>
+    </p:extLst>
+  </p:cSld>
+  <p:clrMapOvr>
+    <a:masterClrMapping/>
+  </p:clrMapOvr>
+</p:sld>
+</file>
+
 <file path=ppt/theme/theme1.xml><?xml version="1.0" encoding="utf-8"?>
 <a:theme xmlns:a="http://schemas.openxmlformats.org/drawingml/2006/main" name="MW_Public_widescreen">
   <a:themeElements>
@@ -7255,16 +7870,12 @@
 </file>
 
 <file path=customXml/item1.xml><?xml version="1.0" encoding="utf-8"?>
-<p:properties xmlns:p="http://schemas.microsoft.com/office/2006/metadata/properties" xmlns:xsi="http://www.w3.org/2001/XMLSchema-instance" xmlns:pc="http://schemas.microsoft.com/office/infopath/2007/PartnerControls">
-  <documentManagement>
-    <lcf76f155ced4ddcb4097134ff3c332f xmlns="a70944c9-f5be-4b0f-89c7-00caf47c665c">
-      <Terms xmlns="http://schemas.microsoft.com/office/infopath/2007/PartnerControls"/>
-    </lcf76f155ced4ddcb4097134ff3c332f>
-    <TaxCatchAll xmlns="19f94994-4311-4823-a682-47492cb9e3e3" xsi:nil="true"/>
-    <_ip_UnifiedCompliancePolicyUIAction xmlns="http://schemas.microsoft.com/sharepoint/v3" xsi:nil="true"/>
-    <_ip_UnifiedCompliancePolicyProperties xmlns="http://schemas.microsoft.com/sharepoint/v3" xsi:nil="true"/>
-  </documentManagement>
-</p:properties>
+<?mso-contentType ?>
+<FormTemplates xmlns="http://schemas.microsoft.com/sharepoint/v3/contenttype/forms">
+  <Display>DocumentLibraryForm</Display>
+  <Edit>DocumentLibraryForm</Edit>
+  <New>DocumentLibraryForm</New>
+</FormTemplates>
 </file>
 
 <file path=customXml/item2.xml><?xml version="1.0" encoding="utf-8"?>
@@ -7528,28 +8139,22 @@
 </file>
 
 <file path=customXml/item3.xml><?xml version="1.0" encoding="utf-8"?>
-<?mso-contentType ?>
-<FormTemplates xmlns="http://schemas.microsoft.com/sharepoint/v3/contenttype/forms">
-  <Display>DocumentLibraryForm</Display>
-  <Edit>DocumentLibraryForm</Edit>
-  <New>DocumentLibraryForm</New>
-</FormTemplates>
+<p:properties xmlns:p="http://schemas.microsoft.com/office/2006/metadata/properties" xmlns:xsi="http://www.w3.org/2001/XMLSchema-instance" xmlns:pc="http://schemas.microsoft.com/office/infopath/2007/PartnerControls">
+  <documentManagement>
+    <lcf76f155ced4ddcb4097134ff3c332f xmlns="a70944c9-f5be-4b0f-89c7-00caf47c665c">
+      <Terms xmlns="http://schemas.microsoft.com/office/infopath/2007/PartnerControls"/>
+    </lcf76f155ced4ddcb4097134ff3c332f>
+    <TaxCatchAll xmlns="19f94994-4311-4823-a682-47492cb9e3e3" xsi:nil="true"/>
+    <_ip_UnifiedCompliancePolicyUIAction xmlns="http://schemas.microsoft.com/sharepoint/v3" xsi:nil="true"/>
+    <_ip_UnifiedCompliancePolicyProperties xmlns="http://schemas.microsoft.com/sharepoint/v3" xsi:nil="true"/>
+  </documentManagement>
+</p:properties>
 </file>
 
 <file path=customXml/itemProps1.xml><?xml version="1.0" encoding="utf-8"?>
-<ds:datastoreItem xmlns:ds="http://schemas.openxmlformats.org/officeDocument/2006/customXml" ds:itemID="{73B851B7-D313-4E85-A1E0-5976CFE11EC3}">
+<ds:datastoreItem xmlns:ds="http://schemas.openxmlformats.org/officeDocument/2006/customXml" ds:itemID="{3B61DF2E-245C-45DF-A9A5-EABECEA4295F}">
   <ds:schemaRefs>
-    <ds:schemaRef ds:uri="http://schemas.microsoft.com/office/2006/metadata/properties"/>
-    <ds:schemaRef ds:uri="http://purl.org/dc/terms/"/>
-    <ds:schemaRef ds:uri="http://purl.org/dc/elements/1.1/"/>
-    <ds:schemaRef ds:uri="http://purl.org/dc/dcmitype/"/>
-    <ds:schemaRef ds:uri="http://schemas.microsoft.com/office/infopath/2007/PartnerControls"/>
-    <ds:schemaRef ds:uri="http://schemas.openxmlformats.org/package/2006/metadata/core-properties"/>
-    <ds:schemaRef ds:uri="http://schemas.microsoft.com/office/2006/documentManagement/types"/>
-    <ds:schemaRef ds:uri="19f94994-4311-4823-a682-47492cb9e3e3"/>
-    <ds:schemaRef ds:uri="a70944c9-f5be-4b0f-89c7-00caf47c665c"/>
-    <ds:schemaRef ds:uri="http://www.w3.org/XML/1998/namespace"/>
-    <ds:schemaRef ds:uri="http://schemas.microsoft.com/sharepoint/v3"/>
+    <ds:schemaRef ds:uri="http://schemas.microsoft.com/sharepoint/v3/contenttype/forms"/>
   </ds:schemaRefs>
 </ds:datastoreItem>
 </file>
@@ -7575,9 +8180,19 @@
 </file>
 
 <file path=customXml/itemProps3.xml><?xml version="1.0" encoding="utf-8"?>
-<ds:datastoreItem xmlns:ds="http://schemas.openxmlformats.org/officeDocument/2006/customXml" ds:itemID="{3B61DF2E-245C-45DF-A9A5-EABECEA4295F}">
+<ds:datastoreItem xmlns:ds="http://schemas.openxmlformats.org/officeDocument/2006/customXml" ds:itemID="{73B851B7-D313-4E85-A1E0-5976CFE11EC3}">
   <ds:schemaRefs>
-    <ds:schemaRef ds:uri="http://schemas.microsoft.com/sharepoint/v3/contenttype/forms"/>
+    <ds:schemaRef ds:uri="http://schemas.microsoft.com/office/2006/metadata/properties"/>
+    <ds:schemaRef ds:uri="http://purl.org/dc/terms/"/>
+    <ds:schemaRef ds:uri="http://purl.org/dc/elements/1.1/"/>
+    <ds:schemaRef ds:uri="http://purl.org/dc/dcmitype/"/>
+    <ds:schemaRef ds:uri="http://schemas.microsoft.com/office/infopath/2007/PartnerControls"/>
+    <ds:schemaRef ds:uri="http://schemas.openxmlformats.org/package/2006/metadata/core-properties"/>
+    <ds:schemaRef ds:uri="http://schemas.microsoft.com/office/2006/documentManagement/types"/>
+    <ds:schemaRef ds:uri="19f94994-4311-4823-a682-47492cb9e3e3"/>
+    <ds:schemaRef ds:uri="a70944c9-f5be-4b0f-89c7-00caf47c665c"/>
+    <ds:schemaRef ds:uri="http://www.w3.org/XML/1998/namespace"/>
+    <ds:schemaRef ds:uri="http://schemas.microsoft.com/sharepoint/v3"/>
   </ds:schemaRefs>
 </ds:datastoreItem>
 </file>
</xml_diff>